<commit_message>
Fixing images for SQL CRUD slides
</commit_message>
<xml_diff>
--- a/Courses/Software-Sciences/Module-3-Databases-New/05-SQL-INSERT-UPDATE-DELETE/05-SQL-INSERT-UPDATE-DELETE.pptx
+++ b/Courses/Software-Sciences/Module-3-Databases-New/05-SQL-INSERT-UPDATE-DELETE/05-SQL-INSERT-UPDATE-DELETE.pptx
@@ -443,7 +443,7 @@
           <a:p>
             <a:fld id="{4E087215-0C8F-4762-A664-737A353EC9A4}" type="datetimeFigureOut">
               <a:rPr lang="bg-BG" smtClean="0"/>
-              <a:t>6.10.2023 г.</a:t>
+              <a:t>27.11.2023 г.</a:t>
             </a:fld>
             <a:endParaRPr lang="bg-BG"/>
           </a:p>
@@ -639,7 +639,7 @@
           <a:p>
             <a:fld id="{72D84649-876A-46C9-8472-14CB09C070D8}" type="datetimeFigureOut">
               <a:rPr lang="en-US" smtClean="0"/>
-              <a:t>10/6/2023</a:t>
+              <a:t>11/27/2023</a:t>
             </a:fld>
             <a:endParaRPr lang="en-US"/>
           </a:p>
@@ -8281,32 +8281,6 @@
           <a:chExt cx="0" cy="0"/>
         </a:xfrm>
       </p:grpSpPr>
-      <p:pic>
-        <p:nvPicPr>
-          <p:cNvPr id="2050" name="Picture 2" descr="File:Delete.png - Vintage Story Wiki"/>
-          <p:cNvPicPr>
-            <a:picLocks noChangeAspect="1" noChangeArrowheads="1"/>
-          </p:cNvPicPr>
-          <p:nvPr/>
-        </p:nvPicPr>
-        <p:blipFill>
-          <a:blip r:embed="rId2" cstate="print"/>
-          <a:srcRect/>
-          <a:stretch>
-            <a:fillRect/>
-          </a:stretch>
-        </p:blipFill>
-        <p:spPr bwMode="auto">
-          <a:xfrm>
-            <a:off x="4881000" y="1314000"/>
-            <a:ext cx="2438400" cy="2438400"/>
-          </a:xfrm>
-          <a:prstGeom prst="rect">
-            <a:avLst/>
-          </a:prstGeom>
-          <a:noFill/>
-        </p:spPr>
-      </p:pic>
       <p:sp>
         <p:nvSpPr>
           <p:cNvPr id="5" name="Подзаглавие 4">
@@ -8364,6 +8338,53 @@
           </a:p>
         </p:txBody>
       </p:sp>
+      <p:pic>
+        <p:nvPicPr>
+          <p:cNvPr id="1026" name="Picture 2" descr="DX Delete Attached Media – WordPress plugin | WordPress.org">
+            <a:extLst>
+              <a:ext uri="{FF2B5EF4-FFF2-40B4-BE49-F238E27FC236}">
+                <a16:creationId xmlns:a16="http://schemas.microsoft.com/office/drawing/2014/main" id="{93DA4F4F-ED7F-3E89-493A-9256C363D549}"/>
+              </a:ext>
+            </a:extLst>
+          </p:cNvPr>
+          <p:cNvPicPr>
+            <a:picLocks noChangeAspect="1" noChangeArrowheads="1"/>
+          </p:cNvPicPr>
+          <p:nvPr/>
+        </p:nvPicPr>
+        <p:blipFill>
+          <a:blip r:embed="rId2">
+            <a:extLst>
+              <a:ext uri="{28A0092B-C50C-407E-A947-70E740481C1C}">
+                <a14:useLocalDpi xmlns:a14="http://schemas.microsoft.com/office/drawing/2010/main" val="0"/>
+              </a:ext>
+            </a:extLst>
+          </a:blip>
+          <a:srcRect/>
+          <a:stretch>
+            <a:fillRect/>
+          </a:stretch>
+        </p:blipFill>
+        <p:spPr bwMode="auto">
+          <a:xfrm>
+            <a:off x="4676400" y="1219800"/>
+            <a:ext cx="2839200" cy="2839200"/>
+          </a:xfrm>
+          <a:prstGeom prst="flowChartConnector">
+            <a:avLst/>
+          </a:prstGeom>
+          <a:noFill/>
+          <a:extLst>
+            <a:ext uri="{909E8E84-426E-40DD-AFC4-6F175D3DCCD1}">
+              <a14:hiddenFill xmlns:a14="http://schemas.microsoft.com/office/drawing/2010/main">
+                <a:solidFill>
+                  <a:srgbClr val="FFFFFF"/>
+                </a:solidFill>
+              </a14:hiddenFill>
+            </a:ext>
+          </a:extLst>
+        </p:spPr>
+      </p:pic>
     </p:spTree>
     <p:extLst>
       <p:ext uri="{BB962C8B-B14F-4D97-AF65-F5344CB8AC3E}">

</xml_diff>

<commit_message>
Updating slides for SQL CRUD
</commit_message>
<xml_diff>
--- a/Courses/Software-Sciences/Module-3-Databases-New/05-SQL-INSERT-UPDATE-DELETE/05-SQL-INSERT-UPDATE-DELETE.pptx
+++ b/Courses/Software-Sciences/Module-3-Databases-New/05-SQL-INSERT-UPDATE-DELETE/05-SQL-INSERT-UPDATE-DELETE.pptx
@@ -443,7 +443,7 @@
           <a:p>
             <a:fld id="{4E087215-0C8F-4762-A664-737A353EC9A4}" type="datetimeFigureOut">
               <a:rPr lang="bg-BG" smtClean="0"/>
-              <a:t>27.11.2023 г.</a:t>
+              <a:t>28.11.2023 г.</a:t>
             </a:fld>
             <a:endParaRPr lang="bg-BG"/>
           </a:p>
@@ -639,7 +639,7 @@
           <a:p>
             <a:fld id="{72D84649-876A-46C9-8472-14CB09C070D8}" type="datetimeFigureOut">
               <a:rPr lang="en-US" smtClean="0"/>
-              <a:t>11/27/2023</a:t>
+              <a:t>11/28/2023</a:t>
             </a:fld>
             <a:endParaRPr lang="en-US"/>
           </a:p>
@@ -8340,19 +8340,19 @@
       </p:sp>
       <p:pic>
         <p:nvPicPr>
-          <p:cNvPr id="1026" name="Picture 2" descr="DX Delete Attached Media – WordPress plugin | WordPress.org">
+          <p:cNvPr id="9" name="Picture 8" descr="A circular logo with a circular object with a red x in the middle&#10;&#10;Description automatically generated">
             <a:extLst>
               <a:ext uri="{FF2B5EF4-FFF2-40B4-BE49-F238E27FC236}">
-                <a16:creationId xmlns:a16="http://schemas.microsoft.com/office/drawing/2014/main" id="{93DA4F4F-ED7F-3E89-493A-9256C363D549}"/>
+                <a16:creationId xmlns:a16="http://schemas.microsoft.com/office/drawing/2014/main" id="{1D7AD143-D451-1205-1F34-66CBBECD065D}"/>
               </a:ext>
             </a:extLst>
           </p:cNvPr>
           <p:cNvPicPr>
-            <a:picLocks noChangeAspect="1" noChangeArrowheads="1"/>
+            <a:picLocks noChangeAspect="1"/>
           </p:cNvPicPr>
           <p:nvPr/>
         </p:nvPicPr>
-        <p:blipFill>
+        <p:blipFill rotWithShape="1">
           <a:blip r:embed="rId2">
             <a:extLst>
               <a:ext uri="{28A0092B-C50C-407E-A947-70E740481C1C}">
@@ -8360,29 +8360,17 @@
               </a:ext>
             </a:extLst>
           </a:blip>
-          <a:srcRect/>
-          <a:stretch>
-            <a:fillRect/>
-          </a:stretch>
+          <a:srcRect l="18461" t="19693" r="18461" b="18768"/>
+          <a:stretch/>
         </p:blipFill>
-        <p:spPr bwMode="auto">
+        <p:spPr>
           <a:xfrm>
-            <a:off x="4676400" y="1219800"/>
-            <a:ext cx="2839200" cy="2839200"/>
+            <a:off x="4701000" y="1292049"/>
+            <a:ext cx="2790000" cy="2721951"/>
           </a:xfrm>
           <a:prstGeom prst="flowChartConnector">
             <a:avLst/>
           </a:prstGeom>
-          <a:noFill/>
-          <a:extLst>
-            <a:ext uri="{909E8E84-426E-40DD-AFC4-6F175D3DCCD1}">
-              <a14:hiddenFill xmlns:a14="http://schemas.microsoft.com/office/drawing/2010/main">
-                <a:solidFill>
-                  <a:srgbClr val="FFFFFF"/>
-                </a:solidFill>
-              </a14:hiddenFill>
-            </a:ext>
-          </a:extLst>
         </p:spPr>
       </p:pic>
     </p:spTree>
@@ -14311,34 +14299,6 @@
           <a:chExt cx="0" cy="0"/>
         </a:xfrm>
       </p:grpSpPr>
-      <p:pic>
-        <p:nvPicPr>
-          <p:cNvPr id="37890" name="Picture 2" descr="Add - Free signs icons"/>
-          <p:cNvPicPr>
-            <a:picLocks noChangeAspect="1" noChangeArrowheads="1"/>
-          </p:cNvPicPr>
-          <p:nvPr/>
-        </p:nvPicPr>
-        <p:blipFill>
-          <a:blip r:embed="rId2" cstate="print">
-            <a:lum bright="100000"/>
-          </a:blip>
-          <a:srcRect/>
-          <a:stretch>
-            <a:fillRect/>
-          </a:stretch>
-        </p:blipFill>
-        <p:spPr bwMode="auto">
-          <a:xfrm>
-            <a:off x="4746000" y="1269000"/>
-            <a:ext cx="2716800" cy="2716801"/>
-          </a:xfrm>
-          <a:prstGeom prst="rect">
-            <a:avLst/>
-          </a:prstGeom>
-          <a:noFill/>
-        </p:spPr>
-      </p:pic>
       <p:sp>
         <p:nvSpPr>
           <p:cNvPr id="5" name="Подзаглавие 4">
@@ -14396,6 +14356,49 @@
           </a:p>
         </p:txBody>
       </p:sp>
+      <p:pic>
+        <p:nvPicPr>
+          <p:cNvPr id="3" name="Picture 2" descr="A graphic of a database&#10;&#10;Description automatically generated">
+            <a:extLst>
+              <a:ext uri="{FF2B5EF4-FFF2-40B4-BE49-F238E27FC236}">
+                <a16:creationId xmlns:a16="http://schemas.microsoft.com/office/drawing/2014/main" id="{D93CCD6C-A52C-92F8-248D-A653332645E3}"/>
+              </a:ext>
+            </a:extLst>
+          </p:cNvPr>
+          <p:cNvPicPr>
+            <a:picLocks noChangeAspect="1"/>
+          </p:cNvPicPr>
+          <p:nvPr/>
+        </p:nvPicPr>
+        <p:blipFill>
+          <a:blip r:embed="rId2">
+            <a:extLst>
+              <a:ext uri="{28A0092B-C50C-407E-A947-70E740481C1C}">
+                <a14:useLocalDpi xmlns:a14="http://schemas.microsoft.com/office/drawing/2010/main" val="0"/>
+              </a:ext>
+            </a:extLst>
+          </a:blip>
+          <a:stretch>
+            <a:fillRect/>
+          </a:stretch>
+        </p:blipFill>
+        <p:spPr>
+          <a:xfrm>
+            <a:off x="4730988" y="1269000"/>
+            <a:ext cx="2730024" cy="2730024"/>
+          </a:xfrm>
+          <a:prstGeom prst="ellipse">
+            <a:avLst/>
+          </a:prstGeom>
+          <a:ln>
+            <a:solidFill>
+              <a:schemeClr val="bg2">
+                <a:lumMod val="75000"/>
+              </a:schemeClr>
+            </a:solidFill>
+          </a:ln>
+        </p:spPr>
+      </p:pic>
     </p:spTree>
     <p:extLst>
       <p:ext uri="{BB962C8B-B14F-4D97-AF65-F5344CB8AC3E}">
@@ -16066,36 +16069,6 @@
           <a:chExt cx="0" cy="0"/>
         </a:xfrm>
       </p:grpSpPr>
-      <p:pic>
-        <p:nvPicPr>
-          <p:cNvPr id="9" name="Picture 8"/>
-          <p:cNvPicPr>
-            <a:picLocks noChangeAspect="1"/>
-          </p:cNvPicPr>
-          <p:nvPr/>
-        </p:nvPicPr>
-        <p:blipFill>
-          <a:blip r:embed="rId2" cstate="print">
-            <a:extLst>
-              <a:ext uri="{28A0092B-C50C-407E-A947-70E740481C1C}">
-                <a14:useLocalDpi xmlns:a14="http://schemas.microsoft.com/office/drawing/2010/main" val="0"/>
-              </a:ext>
-            </a:extLst>
-          </a:blip>
-          <a:stretch>
-            <a:fillRect/>
-          </a:stretch>
-        </p:blipFill>
-        <p:spPr>
-          <a:xfrm>
-            <a:off x="4718304" y="1155192"/>
-            <a:ext cx="2761488" cy="2761488"/>
-          </a:xfrm>
-          <a:prstGeom prst="rect">
-            <a:avLst/>
-          </a:prstGeom>
-        </p:spPr>
-      </p:pic>
       <p:sp>
         <p:nvSpPr>
           <p:cNvPr id="3" name="Подзаглавие 2">
@@ -16153,6 +16126,41 @@
           </a:p>
         </p:txBody>
       </p:sp>
+      <p:pic>
+        <p:nvPicPr>
+          <p:cNvPr id="8" name="Picture 7" descr="A circular logo with a pencil and a circular object&#10;&#10;Description automatically generated">
+            <a:extLst>
+              <a:ext uri="{FF2B5EF4-FFF2-40B4-BE49-F238E27FC236}">
+                <a16:creationId xmlns:a16="http://schemas.microsoft.com/office/drawing/2014/main" id="{9324A23E-EB81-A3C9-C93E-AEF97BB9598B}"/>
+              </a:ext>
+            </a:extLst>
+          </p:cNvPr>
+          <p:cNvPicPr>
+            <a:picLocks noChangeAspect="1"/>
+          </p:cNvPicPr>
+          <p:nvPr/>
+        </p:nvPicPr>
+        <p:blipFill rotWithShape="1">
+          <a:blip r:embed="rId2">
+            <a:extLst>
+              <a:ext uri="{28A0092B-C50C-407E-A947-70E740481C1C}">
+                <a14:useLocalDpi xmlns:a14="http://schemas.microsoft.com/office/drawing/2010/main" val="0"/>
+              </a:ext>
+            </a:extLst>
+          </a:blip>
+          <a:srcRect l="16289" t="16998" r="16430" b="16430"/>
+          <a:stretch/>
+        </p:blipFill>
+        <p:spPr>
+          <a:xfrm>
+            <a:off x="4746000" y="1297421"/>
+            <a:ext cx="2700000" cy="2671579"/>
+          </a:xfrm>
+          <a:prstGeom prst="ellipse">
+            <a:avLst/>
+          </a:prstGeom>
+        </p:spPr>
+      </p:pic>
     </p:spTree>
     <p:extLst>
       <p:ext uri="{BB962C8B-B14F-4D97-AF65-F5344CB8AC3E}">

</xml_diff>